<commit_message>
updated guided capstone project sections 6 and 7
</commit_message>
<xml_diff>
--- a/GuidedCapstone - Ski Resort/Step Seven - Slide Deck/Guided Capstone Slide Deck.pptx
+++ b/GuidedCapstone - Ski Resort/Step Seven - Slide Deck/Guided Capstone Slide Deck.pptx
@@ -3378,18 +3378,33 @@
         </p:nvSpPr>
         <p:spPr>
           <a:xfrm>
-            <a:off x="1524000" y="2404533"/>
-            <a:ext cx="9144000" cy="2853267"/>
+            <a:off x="1524000" y="1987826"/>
+            <a:ext cx="9144000" cy="4230411"/>
           </a:xfrm>
         </p:spPr>
         <p:txBody>
-          <a:bodyPr/>
+          <a:bodyPr>
+            <a:normAutofit/>
+          </a:bodyPr>
           <a:lstStyle/>
           <a:p>
             <a:pPr algn="l"/>
             <a:r>
               <a:rPr lang="en-US" dirty="0"/>
               <a:t>Big Mountain recently installed an additional chair lift to help increase the distribution of visitors, which increased operating costs this season. The business expects recommendations on recouping the increased operating costs in order to maintain profit margin of 9.2% and a projection of this year’s annual revenue based on the recommendations.</a:t>
+            </a:r>
+            <a:r>
+              <a:rPr lang="en-US" dirty="0">
+                <a:effectLst/>
+              </a:rPr>
+              <a:t> </a:t>
+            </a:r>
+          </a:p>
+          <a:p>
+            <a:pPr algn="l"/>
+            <a:r>
+              <a:rPr lang="en-US" dirty="0"/>
+              <a:t>This project aims to build a predictive model for ticket price based on a number of facilities, or properties, boasted by resorts (at the resorts). This model will be used to provide guidance for Big Mountain's pricing and future facility investment plans.</a:t>
             </a:r>
             <a:r>
               <a:rPr lang="en-US" dirty="0">
@@ -3480,18 +3495,28 @@
             <p:ph idx="1"/>
           </p:nvPr>
         </p:nvSpPr>
-        <p:spPr/>
-        <p:txBody>
-          <a:bodyPr/>
+        <p:spPr>
+          <a:xfrm>
+            <a:off x="838200" y="1444487"/>
+            <a:ext cx="10515600" cy="5048388"/>
+          </a:xfrm>
+        </p:spPr>
+        <p:txBody>
+          <a:bodyPr>
+            <a:normAutofit fontScale="92500" lnSpcReduction="10000"/>
+          </a:bodyPr>
           <a:lstStyle/>
           <a:p>
             <a:r>
               <a:rPr lang="en-US" dirty="0"/>
-              <a:t>We recommend they build a similar model to predict Adult Weekend Ticket Prices and test scenario 1, where we increased the vertical drop and installed the additional chair lift, without additional snow making coverage. The increased ticket price is only $1.99, which can be easily accepted by the visitors.</a:t>
-            </a:r>
-          </a:p>
-          <a:p>
-            <a:endParaRPr lang="en-US" dirty="0"/>
+              <a:t>The predicted Adult Weekend ticket price for Big Mountain is $94.22, which is a suggested increase from the current cost of $81. This prediction is based on the features identified from the other 329 resorts fitting the model to Big Mountain and the validity of our model lies in the assumption that other resorts accurately set their prices according to what the market (the ticket-buying public) supports.</a:t>
+            </a:r>
+          </a:p>
+          <a:p>
+            <a:r>
+              <a:rPr lang="en-US" dirty="0"/>
+              <a:t>We reviewed several potential scenarios for either cutting costs or increasing revenue (from ticket prices) and we recommend testing scenario 1, where we increased the vertical drop and installed the additional chair lift, without additional snow making coverage. The increased ticket price is only $1.99, which can be easily accepted by the visitors, and it would produce an increase in profit over the season. An increase in the snow making area makes no difference in the model prediction, therefore it wouldn’t make sense to spend additional money increasing snow making area when it’s not producing additional revenue.</a:t>
+            </a:r>
           </a:p>
           <a:p>
             <a:endParaRPr lang="en-US" dirty="0"/>
@@ -3546,19 +3571,17 @@
         </p:nvSpPr>
         <p:spPr/>
         <p:txBody>
-          <a:bodyPr/>
+          <a:bodyPr>
+            <a:normAutofit/>
+          </a:bodyPr>
           <a:lstStyle/>
           <a:p>
             <a:pPr algn="ctr"/>
-            <a:r>
-              <a:rPr lang="en-US" b="1" dirty="0"/>
-              <a:t>Modeling</a:t>
-            </a:r>
             <a:r>
               <a:rPr lang="en-US" b="1" dirty="0">
                 <a:effectLst/>
               </a:rPr>
-              <a:t> results and analysis</a:t>
+              <a:t>Data Wrangling &amp; Cleaning</a:t>
             </a:r>
             <a:endParaRPr lang="en-US" b="1" dirty="0"/>
           </a:p>
@@ -3582,10 +3605,47 @@
         </p:nvSpPr>
         <p:spPr/>
         <p:txBody>
-          <a:bodyPr/>
-          <a:lstStyle/>
-          <a:p>
-            <a:endParaRPr lang="en-US"/>
+          <a:bodyPr>
+            <a:normAutofit fontScale="92500" lnSpcReduction="10000"/>
+          </a:bodyPr>
+          <a:lstStyle/>
+          <a:p>
+            <a:r>
+              <a:rPr lang="en-US" dirty="0"/>
+              <a:t>The data we started with contained some ticket price values, but with a number of missing values that led to several rows being dropped completely.</a:t>
+            </a:r>
+          </a:p>
+          <a:p>
+            <a:r>
+              <a:rPr lang="en-US" dirty="0"/>
+              <a:t>There were two kinds of ticket price, weekend and weekday. The weekend and weekday prices were pretty equal and since the Adult Weekend column had fewer missing values, we decided to drop the Adult Weekday column.</a:t>
+            </a:r>
+          </a:p>
+          <a:p>
+            <a:r>
+              <a:rPr lang="en-US" dirty="0"/>
+              <a:t>A data error was corrected, and some other rows dropped.</a:t>
+            </a:r>
+          </a:p>
+          <a:p>
+            <a:r>
+              <a:rPr lang="en-US" dirty="0"/>
+              <a:t>We also obtained some additional US state population and size data with which to augment the dataset, which also required some cleaning.</a:t>
+            </a:r>
+          </a:p>
+          <a:p>
+            <a:r>
+              <a:rPr lang="en-US" dirty="0"/>
+              <a:t>The target feature for our predictive model is the ‘</a:t>
+            </a:r>
+            <a:r>
+              <a:rPr lang="en-US" dirty="0" err="1"/>
+              <a:t>AdultWeekend</a:t>
+            </a:r>
+            <a:r>
+              <a:rPr lang="en-US" dirty="0"/>
+              <a:t>’ variable.</a:t>
+            </a:r>
           </a:p>
         </p:txBody>
       </p:sp>
@@ -3637,19 +3697,17 @@
         </p:nvSpPr>
         <p:spPr/>
         <p:txBody>
-          <a:bodyPr/>
+          <a:bodyPr>
+            <a:normAutofit/>
+          </a:bodyPr>
           <a:lstStyle/>
           <a:p>
             <a:pPr algn="ctr"/>
-            <a:r>
-              <a:rPr lang="en-US" b="1" dirty="0"/>
-              <a:t>Modeling</a:t>
-            </a:r>
             <a:r>
               <a:rPr lang="en-US" b="1" dirty="0">
                 <a:effectLst/>
               </a:rPr>
-              <a:t> results and analysis</a:t>
+              <a:t>Exploratory Data Analysis</a:t>
             </a:r>
             <a:endParaRPr lang="en-US" dirty="0"/>
           </a:p>
@@ -3673,10 +3731,92 @@
         </p:nvSpPr>
         <p:spPr/>
         <p:txBody>
-          <a:bodyPr/>
-          <a:lstStyle/>
-          <a:p>
-            <a:endParaRPr lang="en-US"/>
+          <a:bodyPr>
+            <a:normAutofit fontScale="85000" lnSpcReduction="20000"/>
+          </a:bodyPr>
+          <a:lstStyle/>
+          <a:p>
+            <a:r>
+              <a:rPr lang="en-US" dirty="0"/>
+              <a:t>We explored the state summary data in great detail and created several new features from the state data: ‘resorts_per_100kcapita’ and ’resorts_per_100ksq_mile’ to analyze.</a:t>
+            </a:r>
+          </a:p>
+          <a:p>
+            <a:r>
+              <a:rPr lang="en-US" dirty="0"/>
+              <a:t>We merged our state summary features into the ski resort data and added "state resort competition” features: ‘</a:t>
+            </a:r>
+            <a:r>
+              <a:rPr lang="en-US" dirty="0" err="1"/>
+              <a:t>resort_skiable_area_ac_state_ratio</a:t>
+            </a:r>
+            <a:r>
+              <a:rPr lang="en-US" dirty="0"/>
+              <a:t>’, ’</a:t>
+            </a:r>
+            <a:r>
+              <a:rPr lang="en-US" dirty="0" err="1"/>
+              <a:t>resort_days_open_state_ratio</a:t>
+            </a:r>
+            <a:r>
+              <a:rPr lang="en-US" dirty="0"/>
+              <a:t>’, ’</a:t>
+            </a:r>
+            <a:r>
+              <a:rPr lang="en-US" dirty="0" err="1"/>
+              <a:t>resort_terrain_park_state_ratio</a:t>
+            </a:r>
+            <a:r>
+              <a:rPr lang="en-US" dirty="0"/>
+              <a:t>’ and ’</a:t>
+            </a:r>
+            <a:r>
+              <a:rPr lang="en-US" dirty="0" err="1"/>
+              <a:t>resort_night_skiing_state_ratio</a:t>
+            </a:r>
+            <a:r>
+              <a:rPr lang="en-US" dirty="0"/>
+              <a:t>’.</a:t>
+            </a:r>
+          </a:p>
+          <a:p>
+            <a:r>
+              <a:rPr lang="en-US" dirty="0"/>
+              <a:t>We then attempted to gain a high level view of relationships amongst the features by creating a correlation heatmap hoping to identify patterns.</a:t>
+            </a:r>
+          </a:p>
+          <a:p>
+            <a:r>
+              <a:rPr lang="en-US" dirty="0"/>
+              <a:t>Since correlation can mask relationships between two variables, we created a series of scatterplots to really dive into how ticket price varies with other numeric features. In the scatterplots you see what some of the high correlations were clearly picking up on. There's a strong positive correlation with ’</a:t>
+            </a:r>
+            <a:r>
+              <a:rPr lang="en-US" dirty="0" err="1"/>
+              <a:t>vertical_drop</a:t>
+            </a:r>
+            <a:r>
+              <a:rPr lang="en-US" dirty="0"/>
+              <a:t>’, ’</a:t>
+            </a:r>
+            <a:r>
+              <a:rPr lang="en-US" dirty="0" err="1"/>
+              <a:t>fastQuads</a:t>
+            </a:r>
+            <a:r>
+              <a:rPr lang="en-US" dirty="0"/>
+              <a:t>’, ’Runs’, ’</a:t>
+            </a:r>
+            <a:r>
+              <a:rPr lang="en-US" dirty="0" err="1"/>
+              <a:t>total_chairs</a:t>
+            </a:r>
+            <a:r>
+              <a:rPr lang="en-US" dirty="0"/>
+              <a:t>’ and ’resorts_per_100kcapita’ appears useful.</a:t>
+            </a:r>
+          </a:p>
+          <a:p>
+            <a:endParaRPr lang="en-US" dirty="0"/>
           </a:p>
         </p:txBody>
       </p:sp>
@@ -3726,21 +3866,24 @@
             <p:ph type="title"/>
           </p:nvPr>
         </p:nvSpPr>
-        <p:spPr/>
-        <p:txBody>
-          <a:bodyPr/>
+        <p:spPr>
+          <a:xfrm>
+            <a:off x="838200" y="365125"/>
+            <a:ext cx="10515600" cy="1158875"/>
+          </a:xfrm>
+        </p:spPr>
+        <p:txBody>
+          <a:bodyPr>
+            <a:normAutofit/>
+          </a:bodyPr>
           <a:lstStyle/>
           <a:p>
             <a:pPr algn="ctr"/>
-            <a:r>
-              <a:rPr lang="en-US" b="1" dirty="0"/>
-              <a:t>Modeling</a:t>
-            </a:r>
             <a:r>
               <a:rPr lang="en-US" b="1" dirty="0">
                 <a:effectLst/>
               </a:rPr>
-              <a:t> results and analysis</a:t>
+              <a:t>Pre-Processing and Training Data</a:t>
             </a:r>
             <a:endParaRPr lang="en-US" dirty="0"/>
           </a:p>
@@ -3764,10 +3907,57 @@
         </p:nvSpPr>
         <p:spPr/>
         <p:txBody>
-          <a:bodyPr/>
-          <a:lstStyle/>
-          <a:p>
-            <a:endParaRPr lang="en-US"/>
+          <a:bodyPr>
+            <a:normAutofit fontScale="85000" lnSpcReduction="20000"/>
+          </a:bodyPr>
+          <a:lstStyle/>
+          <a:p>
+            <a:r>
+              <a:rPr lang="en-US" dirty="0"/>
+              <a:t>We checked to see how good the mean is as a predictor and as expected, using the average value as our prediction gives us and R2 of zero on our training set.</a:t>
+            </a:r>
+          </a:p>
+          <a:p>
+            <a:r>
+              <a:rPr lang="en-US" dirty="0"/>
+              <a:t>We created a Linear Regression model to make predictions on both the train and test splits. The linear regression model explains over 80% of the variance on the train set and over 70% on the test set. Cross-validation was used for estimating model performance and the results highlight that assessing model performance in inherently open to variability.</a:t>
+            </a:r>
+          </a:p>
+          <a:p>
+            <a:r>
+              <a:rPr lang="en-US" dirty="0"/>
+              <a:t>We then applied the Random Forest method and we marginally improved upon the default CV results. Both the linear model and the random forest agree that the dominant top four features are: ’</a:t>
+            </a:r>
+            <a:r>
+              <a:rPr lang="en-US" dirty="0" err="1"/>
+              <a:t>fastQuads</a:t>
+            </a:r>
+            <a:r>
+              <a:rPr lang="en-US" dirty="0"/>
+              <a:t>’, ’Runs’, ’Snow </a:t>
+            </a:r>
+            <a:r>
+              <a:rPr lang="en-US" dirty="0" err="1"/>
+              <a:t>Making_ac</a:t>
+            </a:r>
+            <a:r>
+              <a:rPr lang="en-US" dirty="0"/>
+              <a:t>’ and ’</a:t>
+            </a:r>
+            <a:r>
+              <a:rPr lang="en-US" dirty="0" err="1"/>
+              <a:t>vertical_drop</a:t>
+            </a:r>
+            <a:r>
+              <a:rPr lang="en-US" dirty="0"/>
+              <a:t>’.</a:t>
+            </a:r>
+          </a:p>
+          <a:p>
+            <a:r>
+              <a:rPr lang="en-US" dirty="0"/>
+              <a:t>When comparing the linear regression model performance with the random forest regression model performance, The random forest model has a lower cross-validation mean absolute error by almost $1, it the model to use going forward.</a:t>
+            </a:r>
           </a:p>
         </p:txBody>
       </p:sp>
@@ -3825,8 +4015,15 @@
             <a:pPr algn="ctr"/>
             <a:r>
               <a:rPr lang="en-US" b="1" dirty="0"/>
-              <a:t>Summary and conclusion</a:t>
-            </a:r>
+              <a:t>Modeling</a:t>
+            </a:r>
+            <a:r>
+              <a:rPr lang="en-US" b="1" dirty="0">
+                <a:effectLst/>
+              </a:rPr>
+              <a:t> results and analysis:</a:t>
+            </a:r>
+            <a:endParaRPr lang="en-US" b="1" dirty="0"/>
           </a:p>
         </p:txBody>
       </p:sp>
@@ -3846,12 +4043,68 @@
             <p:ph idx="1"/>
           </p:nvPr>
         </p:nvSpPr>
-        <p:spPr/>
-        <p:txBody>
-          <a:bodyPr/>
-          <a:lstStyle/>
-          <a:p>
-            <a:endParaRPr lang="en-US"/>
+        <p:spPr>
+          <a:xfrm>
+            <a:off x="838200" y="1590261"/>
+            <a:ext cx="10515600" cy="4902614"/>
+          </a:xfrm>
+        </p:spPr>
+        <p:txBody>
+          <a:bodyPr>
+            <a:normAutofit fontScale="85000" lnSpcReduction="10000"/>
+          </a:bodyPr>
+          <a:lstStyle/>
+          <a:p>
+            <a:r>
+              <a:rPr lang="en-US" dirty="0"/>
+              <a:t>Big Mountain currently charges $81.00 for the Adult Weekend ticket price, but the Resort's modelled price is $94.22, which is higher than the actual price.</a:t>
+            </a:r>
+          </a:p>
+          <a:p>
+            <a:r>
+              <a:rPr lang="en-US" dirty="0"/>
+              <a:t>We took our model for ski resort ticket price to gain insight into what Big Mountain's ideal ticket price could/should be, and how that might change under various scenarios, for either cutting costs or increasing revenue (from ticket prices). The business has shortlisted some options:</a:t>
+            </a:r>
+          </a:p>
+          <a:p>
+            <a:pPr marL="514350" indent="-514350">
+              <a:buFont typeface="+mj-lt"/>
+              <a:buAutoNum type="arabicPeriod"/>
+            </a:pPr>
+            <a:r>
+              <a:rPr lang="en-US" dirty="0"/>
+              <a:t>Permanently closing up to 10 of the least used runs. This doesn't impact any other resort statistics.</a:t>
+            </a:r>
+          </a:p>
+          <a:p>
+            <a:pPr marL="514350" indent="-514350">
+              <a:buFont typeface="+mj-lt"/>
+              <a:buAutoNum type="arabicPeriod"/>
+            </a:pPr>
+            <a:r>
+              <a:rPr lang="en-US" dirty="0"/>
+              <a:t>Increase the vertical drop by adding a run to a point 150 feet lower down but requiring the installation of an additional chair lift to bring skiers back up, without additional snow making coverage</a:t>
+            </a:r>
+          </a:p>
+          <a:p>
+            <a:pPr marL="514350" indent="-514350">
+              <a:buFont typeface="+mj-lt"/>
+              <a:buAutoNum type="arabicPeriod"/>
+            </a:pPr>
+            <a:r>
+              <a:rPr lang="en-US" dirty="0"/>
+              <a:t>Same as number 2, but adding 2 acres of snow making cover</a:t>
+            </a:r>
+          </a:p>
+          <a:p>
+            <a:pPr marL="514350" indent="-514350">
+              <a:buFont typeface="+mj-lt"/>
+              <a:buAutoNum type="arabicPeriod"/>
+            </a:pPr>
+            <a:r>
+              <a:rPr lang="en-US" dirty="0"/>
+              <a:t>Increase the longest run by 0.2 mile to boast 3.5 miles length, requiring an additional snow making coverage of 4 acres</a:t>
+            </a:r>
           </a:p>
         </p:txBody>
       </p:sp>
@@ -3931,12 +4184,40 @@
             <p:ph idx="1"/>
           </p:nvPr>
         </p:nvSpPr>
-        <p:spPr/>
-        <p:txBody>
-          <a:bodyPr/>
-          <a:lstStyle/>
-          <a:p>
-            <a:endParaRPr lang="en-US"/>
+        <p:spPr>
+          <a:xfrm>
+            <a:off x="838200" y="1417983"/>
+            <a:ext cx="10515600" cy="5074892"/>
+          </a:xfrm>
+        </p:spPr>
+        <p:txBody>
+          <a:bodyPr>
+            <a:normAutofit lnSpcReduction="10000"/>
+          </a:bodyPr>
+          <a:lstStyle/>
+          <a:p>
+            <a:r>
+              <a:rPr lang="en-US" dirty="0"/>
+              <a:t>Big Mountain might be undercharging, so I suggest you increase the ticket price which is supported in the marketplace. You should also review potential scenarios for either cutting costs or increasing revenue (from ticket prices).</a:t>
+            </a:r>
+          </a:p>
+          <a:p>
+            <a:r>
+              <a:rPr lang="en-US" dirty="0"/>
+              <a:t>In addition to the ticket prices and additional operating cost of the new chair lift, maintenance costs might be a useful parameter to investigate.</a:t>
+            </a:r>
+          </a:p>
+          <a:p>
+            <a:r>
+              <a:rPr lang="en-US" dirty="0"/>
+              <a:t>Our model could be lacking some key data, which could attest the higher modeled price or Big Mountain could just be mispricing.</a:t>
+            </a:r>
+          </a:p>
+          <a:p>
+            <a:r>
+              <a:rPr lang="en-US" dirty="0"/>
+              <a:t>If you find the model useful, you could implement it to see if the market really demands the higher price. The business leaders could then task their business analysts to explore and test new combinations of parameters, if the need arises.</a:t>
+            </a:r>
           </a:p>
         </p:txBody>
       </p:sp>

</xml_diff>

<commit_message>
updated guided capstone sections 6 and 7
</commit_message>
<xml_diff>
--- a/GuidedCapstone - Ski Resort/Step Seven - Slide Deck/Guided Capstone Slide Deck.pptx
+++ b/GuidedCapstone - Ski Resort/Step Seven - Slide Deck/Guided Capstone Slide Deck.pptx
@@ -8,10 +8,13 @@
     <p:sldId id="256" r:id="rId2"/>
     <p:sldId id="259" r:id="rId3"/>
     <p:sldId id="260" r:id="rId4"/>
-    <p:sldId id="261" r:id="rId5"/>
-    <p:sldId id="262" r:id="rId6"/>
-    <p:sldId id="263" r:id="rId7"/>
-    <p:sldId id="264" r:id="rId8"/>
+    <p:sldId id="265" r:id="rId5"/>
+    <p:sldId id="267" r:id="rId6"/>
+    <p:sldId id="261" r:id="rId7"/>
+    <p:sldId id="266" r:id="rId8"/>
+    <p:sldId id="262" r:id="rId9"/>
+    <p:sldId id="263" r:id="rId10"/>
+    <p:sldId id="264" r:id="rId11"/>
   </p:sldIdLst>
   <p:sldSz cx="12192000" cy="6858000"/>
   <p:notesSz cx="6858000" cy="9144000"/>
@@ -110,6 +113,11 @@
       </a:defRPr>
     </a:lvl9pPr>
   </p:defaultTextStyle>
+  <p:extLst>
+    <p:ext uri="{EFAFB233-063F-42B5-8137-9DF3F51BA10A}">
+      <p15:sldGuideLst xmlns:p15="http://schemas.microsoft.com/office/powerpoint/2012/main"/>
+    </p:ext>
+  </p:extLst>
 </p:presentation>
 </file>
 
@@ -260,7 +268,7 @@
           <a:p>
             <a:fld id="{BD9AF036-032F-CA4E-8993-7511098F285B}" type="datetimeFigureOut">
               <a:rPr lang="en-US" smtClean="0"/>
-              <a:t>10/2/20</a:t>
+              <a:t>10/24/20</a:t>
             </a:fld>
             <a:endParaRPr lang="en-US"/>
           </a:p>
@@ -458,7 +466,7 @@
           <a:p>
             <a:fld id="{BD9AF036-032F-CA4E-8993-7511098F285B}" type="datetimeFigureOut">
               <a:rPr lang="en-US" smtClean="0"/>
-              <a:t>10/2/20</a:t>
+              <a:t>10/24/20</a:t>
             </a:fld>
             <a:endParaRPr lang="en-US"/>
           </a:p>
@@ -666,7 +674,7 @@
           <a:p>
             <a:fld id="{BD9AF036-032F-CA4E-8993-7511098F285B}" type="datetimeFigureOut">
               <a:rPr lang="en-US" smtClean="0"/>
-              <a:t>10/2/20</a:t>
+              <a:t>10/24/20</a:t>
             </a:fld>
             <a:endParaRPr lang="en-US"/>
           </a:p>
@@ -864,7 +872,7 @@
           <a:p>
             <a:fld id="{BD9AF036-032F-CA4E-8993-7511098F285B}" type="datetimeFigureOut">
               <a:rPr lang="en-US" smtClean="0"/>
-              <a:t>10/2/20</a:t>
+              <a:t>10/24/20</a:t>
             </a:fld>
             <a:endParaRPr lang="en-US"/>
           </a:p>
@@ -1139,7 +1147,7 @@
           <a:p>
             <a:fld id="{BD9AF036-032F-CA4E-8993-7511098F285B}" type="datetimeFigureOut">
               <a:rPr lang="en-US" smtClean="0"/>
-              <a:t>10/2/20</a:t>
+              <a:t>10/24/20</a:t>
             </a:fld>
             <a:endParaRPr lang="en-US"/>
           </a:p>
@@ -1404,7 +1412,7 @@
           <a:p>
             <a:fld id="{BD9AF036-032F-CA4E-8993-7511098F285B}" type="datetimeFigureOut">
               <a:rPr lang="en-US" smtClean="0"/>
-              <a:t>10/2/20</a:t>
+              <a:t>10/24/20</a:t>
             </a:fld>
             <a:endParaRPr lang="en-US"/>
           </a:p>
@@ -1816,7 +1824,7 @@
           <a:p>
             <a:fld id="{BD9AF036-032F-CA4E-8993-7511098F285B}" type="datetimeFigureOut">
               <a:rPr lang="en-US" smtClean="0"/>
-              <a:t>10/2/20</a:t>
+              <a:t>10/24/20</a:t>
             </a:fld>
             <a:endParaRPr lang="en-US"/>
           </a:p>
@@ -1957,7 +1965,7 @@
           <a:p>
             <a:fld id="{BD9AF036-032F-CA4E-8993-7511098F285B}" type="datetimeFigureOut">
               <a:rPr lang="en-US" smtClean="0"/>
-              <a:t>10/2/20</a:t>
+              <a:t>10/24/20</a:t>
             </a:fld>
             <a:endParaRPr lang="en-US"/>
           </a:p>
@@ -2070,7 +2078,7 @@
           <a:p>
             <a:fld id="{BD9AF036-032F-CA4E-8993-7511098F285B}" type="datetimeFigureOut">
               <a:rPr lang="en-US" smtClean="0"/>
-              <a:t>10/2/20</a:t>
+              <a:t>10/24/20</a:t>
             </a:fld>
             <a:endParaRPr lang="en-US"/>
           </a:p>
@@ -2381,7 +2389,7 @@
           <a:p>
             <a:fld id="{BD9AF036-032F-CA4E-8993-7511098F285B}" type="datetimeFigureOut">
               <a:rPr lang="en-US" smtClean="0"/>
-              <a:t>10/2/20</a:t>
+              <a:t>10/24/20</a:t>
             </a:fld>
             <a:endParaRPr lang="en-US"/>
           </a:p>
@@ -2669,7 +2677,7 @@
           <a:p>
             <a:fld id="{BD9AF036-032F-CA4E-8993-7511098F285B}" type="datetimeFigureOut">
               <a:rPr lang="en-US" smtClean="0"/>
-              <a:t>10/2/20</a:t>
+              <a:t>10/24/20</a:t>
             </a:fld>
             <a:endParaRPr lang="en-US"/>
           </a:p>
@@ -2910,7 +2918,7 @@
           <a:p>
             <a:fld id="{BD9AF036-032F-CA4E-8993-7511098F285B}" type="datetimeFigureOut">
               <a:rPr lang="en-US" smtClean="0"/>
-              <a:t>10/2/20</a:t>
+              <a:t>10/24/20</a:t>
             </a:fld>
             <a:endParaRPr lang="en-US"/>
           </a:p>
@@ -3433,6 +3441,133 @@
 </p:sld>
 </file>
 
+<file path=ppt/slides/slide10.xml><?xml version="1.0" encoding="utf-8"?>
+<p:sld xmlns:a="http://schemas.openxmlformats.org/drawingml/2006/main" xmlns:r="http://schemas.openxmlformats.org/officeDocument/2006/relationships" xmlns:p="http://schemas.openxmlformats.org/presentationml/2006/main">
+  <p:cSld>
+    <p:spTree>
+      <p:nvGrpSpPr>
+        <p:cNvPr id="1" name=""/>
+        <p:cNvGrpSpPr/>
+        <p:nvPr/>
+      </p:nvGrpSpPr>
+      <p:grpSpPr>
+        <a:xfrm>
+          <a:off x="0" y="0"/>
+          <a:ext cx="0" cy="0"/>
+          <a:chOff x="0" y="0"/>
+          <a:chExt cx="0" cy="0"/>
+        </a:xfrm>
+      </p:grpSpPr>
+      <p:sp>
+        <p:nvSpPr>
+          <p:cNvPr id="2" name="Title 1">
+            <a:extLst>
+              <a:ext uri="{FF2B5EF4-FFF2-40B4-BE49-F238E27FC236}">
+                <a16:creationId xmlns:a16="http://schemas.microsoft.com/office/drawing/2014/main" id="{D7D79DDE-7A02-D149-855C-2563DB669491}"/>
+              </a:ext>
+            </a:extLst>
+          </p:cNvPr>
+          <p:cNvSpPr>
+            <a:spLocks noGrp="1"/>
+          </p:cNvSpPr>
+          <p:nvPr>
+            <p:ph type="title"/>
+          </p:nvPr>
+        </p:nvSpPr>
+        <p:spPr/>
+        <p:txBody>
+          <a:bodyPr/>
+          <a:lstStyle/>
+          <a:p>
+            <a:pPr algn="ctr"/>
+            <a:r>
+              <a:rPr lang="en-US" b="1" dirty="0"/>
+              <a:t>Summary and conclusion</a:t>
+            </a:r>
+            <a:endParaRPr lang="en-US" dirty="0"/>
+          </a:p>
+        </p:txBody>
+      </p:sp>
+      <p:sp>
+        <p:nvSpPr>
+          <p:cNvPr id="3" name="Content Placeholder 2">
+            <a:extLst>
+              <a:ext uri="{FF2B5EF4-FFF2-40B4-BE49-F238E27FC236}">
+                <a16:creationId xmlns:a16="http://schemas.microsoft.com/office/drawing/2014/main" id="{E446EC71-B591-A842-8CBD-8C05D77D55A2}"/>
+              </a:ext>
+            </a:extLst>
+          </p:cNvPr>
+          <p:cNvSpPr>
+            <a:spLocks noGrp="1"/>
+          </p:cNvSpPr>
+          <p:nvPr>
+            <p:ph idx="1"/>
+          </p:nvPr>
+        </p:nvSpPr>
+        <p:spPr>
+          <a:xfrm>
+            <a:off x="838200" y="1935385"/>
+            <a:ext cx="10515600" cy="4802187"/>
+          </a:xfrm>
+        </p:spPr>
+        <p:txBody>
+          <a:bodyPr>
+            <a:normAutofit/>
+          </a:bodyPr>
+          <a:lstStyle/>
+          <a:p>
+            <a:r>
+              <a:rPr lang="en-US" dirty="0"/>
+              <a:t>Our model could be lacking some key data, which could attest the higher modeled price or Big Mountain could just be undercharging.</a:t>
+            </a:r>
+          </a:p>
+          <a:p>
+            <a:r>
+              <a:rPr lang="en-US" dirty="0"/>
+              <a:t>If Big Mountain is undercharging, we suggest you increase the ticket price which is supported in the marketplace.</a:t>
+            </a:r>
+          </a:p>
+          <a:p>
+            <a:r>
+              <a:rPr lang="en-US" dirty="0"/>
+              <a:t>You should test scenarios 1 and 2:</a:t>
+            </a:r>
+          </a:p>
+          <a:p>
+            <a:pPr lvl="1"/>
+            <a:r>
+              <a:rPr lang="en-US" dirty="0"/>
+              <a:t>Permanently close up to 10 of the least used runs</a:t>
+            </a:r>
+          </a:p>
+          <a:p>
+            <a:pPr lvl="1"/>
+            <a:r>
+              <a:rPr lang="en-US" dirty="0"/>
+              <a:t>Increase the vertical drop and install an additional chair lift</a:t>
+            </a:r>
+          </a:p>
+          <a:p>
+            <a:r>
+              <a:rPr lang="en-US" dirty="0"/>
+              <a:t>Maintenance costs might be a useful parameter to also investigate.</a:t>
+            </a:r>
+          </a:p>
+        </p:txBody>
+      </p:sp>
+    </p:spTree>
+    <p:extLst>
+      <p:ext uri="{BB962C8B-B14F-4D97-AF65-F5344CB8AC3E}">
+        <p14:creationId xmlns:p14="http://schemas.microsoft.com/office/powerpoint/2010/main" val="228566428"/>
+      </p:ext>
+    </p:extLst>
+  </p:cSld>
+  <p:clrMapOvr>
+    <a:masterClrMapping/>
+  </p:clrMapOvr>
+</p:sld>
+</file>
+
 <file path=ppt/slides/slide2.xml><?xml version="1.0" encoding="utf-8"?>
 <p:sld xmlns:a="http://schemas.openxmlformats.org/drawingml/2006/main" xmlns:r="http://schemas.openxmlformats.org/officeDocument/2006/relationships" xmlns:p="http://schemas.openxmlformats.org/presentationml/2006/main">
   <p:cSld>
@@ -3497,29 +3632,40 @@
         </p:nvSpPr>
         <p:spPr>
           <a:xfrm>
-            <a:off x="838200" y="1444487"/>
-            <a:ext cx="10515600" cy="5048388"/>
+            <a:off x="838200" y="2160431"/>
+            <a:ext cx="10515600" cy="3403243"/>
           </a:xfrm>
         </p:spPr>
         <p:txBody>
           <a:bodyPr>
-            <a:normAutofit fontScale="92500" lnSpcReduction="10000"/>
+            <a:normAutofit/>
           </a:bodyPr>
           <a:lstStyle/>
           <a:p>
             <a:r>
               <a:rPr lang="en-US" dirty="0"/>
-              <a:t>The predicted Adult Weekend ticket price for Big Mountain is $94.22, which is a suggested increase from the current cost of $81. This prediction is based on the features identified from the other 329 resorts fitting the model to Big Mountain and the validity of our model lies in the assumption that other resorts accurately set their prices according to what the market (the ticket-buying public) supports.</a:t>
+              <a:t>The predicted Adult Weekend ticket price for Big Mountain is $94.22, which is a suggested increase from the current cost of $81. </a:t>
             </a:r>
           </a:p>
           <a:p>
             <a:r>
               <a:rPr lang="en-US" dirty="0"/>
-              <a:t>We reviewed several potential scenarios for either cutting costs or increasing revenue (from ticket prices) and we recommend testing scenario 1, where we increased the vertical drop and installed the additional chair lift, without additional snow making coverage. The increased ticket price is only $1.99, which can be easily accepted by the visitors, and it would produce an increase in profit over the season. An increase in the snow making area makes no difference in the model prediction, therefore it wouldn’t make sense to spend additional money increasing snow making area when it’s not producing additional revenue.</a:t>
-            </a:r>
-          </a:p>
-          <a:p>
-            <a:endParaRPr lang="en-US" dirty="0"/>
+              <a:t>Our recommendation for either cutting costs or increasing revenue (from ticket prices) is to</a:t>
+            </a:r>
+          </a:p>
+          <a:p>
+            <a:pPr lvl="1"/>
+            <a:r>
+              <a:rPr lang="en-US" dirty="0"/>
+              <a:t>Permanently close up to 10 of the least used runs</a:t>
+            </a:r>
+          </a:p>
+          <a:p>
+            <a:pPr lvl="1"/>
+            <a:r>
+              <a:rPr lang="en-US" dirty="0"/>
+              <a:t>Increase the vertical drop and install an additional chair lift, without additional snow making coverage.</a:t>
+            </a:r>
           </a:p>
         </p:txBody>
       </p:sp>
@@ -3603,12 +3749,29 @@
             <p:ph idx="1"/>
           </p:nvPr>
         </p:nvSpPr>
-        <p:spPr/>
+        <p:spPr>
+          <a:xfrm>
+            <a:off x="838200" y="1983347"/>
+            <a:ext cx="10515600" cy="3232598"/>
+          </a:xfrm>
+        </p:spPr>
         <p:txBody>
           <a:bodyPr>
-            <a:normAutofit fontScale="92500" lnSpcReduction="10000"/>
+            <a:normAutofit/>
           </a:bodyPr>
           <a:lstStyle/>
+          <a:p>
+            <a:r>
+              <a:rPr lang="en-US" dirty="0"/>
+              <a:t>A data error was corrected, and some other rows dropped.</a:t>
+            </a:r>
+          </a:p>
+          <a:p>
+            <a:r>
+              <a:rPr lang="en-US" dirty="0"/>
+              <a:t>We also obtained some additional US state population and size data with which to augment the dataset, which also required some cleaning.</a:t>
+            </a:r>
+          </a:p>
           <a:p>
             <a:r>
               <a:rPr lang="en-US" dirty="0"/>
@@ -3616,36 +3779,10 @@
             </a:r>
           </a:p>
           <a:p>
-            <a:r>
-              <a:rPr lang="en-US" dirty="0"/>
-              <a:t>There were two kinds of ticket price, weekend and weekday. The weekend and weekday prices were pretty equal and since the Adult Weekend column had fewer missing values, we decided to drop the Adult Weekday column.</a:t>
-            </a:r>
-          </a:p>
-          <a:p>
-            <a:r>
-              <a:rPr lang="en-US" dirty="0"/>
-              <a:t>A data error was corrected, and some other rows dropped.</a:t>
-            </a:r>
-          </a:p>
-          <a:p>
-            <a:r>
-              <a:rPr lang="en-US" dirty="0"/>
-              <a:t>We also obtained some additional US state population and size data with which to augment the dataset, which also required some cleaning.</a:t>
-            </a:r>
-          </a:p>
-          <a:p>
-            <a:r>
-              <a:rPr lang="en-US" dirty="0"/>
-              <a:t>The target feature for our predictive model is the ‘</a:t>
-            </a:r>
-            <a:r>
-              <a:rPr lang="en-US" dirty="0" err="1"/>
-              <a:t>AdultWeekend</a:t>
-            </a:r>
-            <a:r>
-              <a:rPr lang="en-US" dirty="0"/>
-              <a:t>’ variable.</a:t>
-            </a:r>
+            <a:pPr marL="0" indent="0">
+              <a:buNone/>
+            </a:pPr>
+            <a:endParaRPr lang="en-US" dirty="0"/>
           </a:p>
         </p:txBody>
       </p:sp>
@@ -3665,6 +3802,14 @@
 <file path=ppt/slides/slide4.xml><?xml version="1.0" encoding="utf-8"?>
 <p:sld xmlns:a="http://schemas.openxmlformats.org/drawingml/2006/main" xmlns:r="http://schemas.openxmlformats.org/officeDocument/2006/relationships" xmlns:p="http://schemas.openxmlformats.org/presentationml/2006/main">
   <p:cSld>
+    <p:bg>
+      <p:bgPr>
+        <a:solidFill>
+          <a:schemeClr val="bg1"/>
+        </a:solidFill>
+        <a:effectLst/>
+      </p:bgPr>
+    </p:bg>
     <p:spTree>
       <p:nvGrpSpPr>
         <p:cNvPr id="1" name=""/>
@@ -3679,12 +3824,72 @@
           <a:chExt cx="0" cy="0"/>
         </a:xfrm>
       </p:grpSpPr>
+      <p:sp useBgFill="1">
+        <p:nvSpPr>
+          <p:cNvPr id="15" name="Rectangle 14">
+            <a:extLst>
+              <a:ext uri="{FF2B5EF4-FFF2-40B4-BE49-F238E27FC236}">
+                <a16:creationId xmlns:a16="http://schemas.microsoft.com/office/drawing/2014/main" id="{DC6BEC6B-5C77-412D-B45A-5B0F46FEDAC7}"/>
+              </a:ext>
+              <a:ext uri="{C183D7F6-B498-43B3-948B-1728B52AA6E4}">
+                <adec:decorative xmlns:adec="http://schemas.microsoft.com/office/drawing/2017/decorative" val="1"/>
+              </a:ext>
+            </a:extLst>
+          </p:cNvPr>
+          <p:cNvSpPr>
+            <a:spLocks noGrp="1" noRot="1" noChangeAspect="1" noMove="1" noResize="1" noEditPoints="1" noAdjustHandles="1" noChangeArrowheads="1" noChangeShapeType="1" noTextEdit="1"/>
+          </p:cNvSpPr>
+          <p:nvPr>
+            <p:extLst>
+              <p:ext uri="{386F3935-93C4-4BCD-93E2-E3B085C9AB24}">
+                <p16:designElem xmlns:p16="http://schemas.microsoft.com/office/powerpoint/2015/main" val="1"/>
+              </p:ext>
+            </p:extLst>
+          </p:nvPr>
+        </p:nvSpPr>
+        <p:spPr>
+          <a:xfrm>
+            <a:off x="-1" y="0"/>
+            <a:ext cx="12188952" cy="6858000"/>
+          </a:xfrm>
+          <a:prstGeom prst="rect">
+            <a:avLst/>
+          </a:prstGeom>
+          <a:ln>
+            <a:noFill/>
+          </a:ln>
+        </p:spPr>
+        <p:style>
+          <a:lnRef idx="2">
+            <a:schemeClr val="accent1">
+              <a:shade val="50000"/>
+            </a:schemeClr>
+          </a:lnRef>
+          <a:fillRef idx="1">
+            <a:schemeClr val="accent1"/>
+          </a:fillRef>
+          <a:effectRef idx="0">
+            <a:schemeClr val="accent1"/>
+          </a:effectRef>
+          <a:fontRef idx="minor">
+            <a:schemeClr val="lt1"/>
+          </a:fontRef>
+        </p:style>
+        <p:txBody>
+          <a:bodyPr rtlCol="0" anchor="ctr"/>
+          <a:lstStyle/>
+          <a:p>
+            <a:pPr algn="ctr"/>
+            <a:endParaRPr lang="en-US"/>
+          </a:p>
+        </p:txBody>
+      </p:sp>
       <p:sp>
         <p:nvSpPr>
           <p:cNvPr id="2" name="Title 1">
             <a:extLst>
               <a:ext uri="{FF2B5EF4-FFF2-40B4-BE49-F238E27FC236}">
-                <a16:creationId xmlns:a16="http://schemas.microsoft.com/office/drawing/2014/main" id="{2DA82B00-DCE9-E04D-A152-9B404B31CE02}"/>
+                <a16:creationId xmlns:a16="http://schemas.microsoft.com/office/drawing/2014/main" id="{B91535B5-E14F-5548-9CCB-243A6F9EFA10}"/>
               </a:ext>
             </a:extLst>
           </p:cNvPr>
@@ -3695,7 +3900,12 @@
             <p:ph type="title"/>
           </p:nvPr>
         </p:nvSpPr>
-        <p:spPr/>
+        <p:spPr>
+          <a:xfrm>
+            <a:off x="838200" y="176214"/>
+            <a:ext cx="10515600" cy="1481188"/>
+          </a:xfrm>
+        </p:spPr>
         <p:txBody>
           <a:bodyPr>
             <a:normAutofit/>
@@ -3704,12 +3914,10 @@
           <a:p>
             <a:pPr algn="ctr"/>
             <a:r>
-              <a:rPr lang="en-US" b="1" dirty="0">
-                <a:effectLst/>
-              </a:rPr>
-              <a:t>Exploratory Data Analysis</a:t>
-            </a:r>
-            <a:endParaRPr lang="en-US" dirty="0"/>
+              <a:rPr lang="en-US" sz="4000" b="1"/>
+              <a:t>Data Wrangling &amp; Cleaning</a:t>
+            </a:r>
+            <a:endParaRPr lang="en-US" sz="4000"/>
           </a:p>
         </p:txBody>
       </p:sp>
@@ -3718,7 +3926,7 @@
           <p:cNvPr id="3" name="Content Placeholder 2">
             <a:extLst>
               <a:ext uri="{FF2B5EF4-FFF2-40B4-BE49-F238E27FC236}">
-                <a16:creationId xmlns:a16="http://schemas.microsoft.com/office/drawing/2014/main" id="{40C92DD6-FE23-8B48-83DC-67388DEF728A}"/>
+                <a16:creationId xmlns:a16="http://schemas.microsoft.com/office/drawing/2014/main" id="{385B34E9-2C29-7448-880A-10C11C675E21}"/>
               </a:ext>
             </a:extLst>
           </p:cNvPr>
@@ -3729,101 +3937,101 @@
             <p:ph idx="1"/>
           </p:nvPr>
         </p:nvSpPr>
-        <p:spPr/>
+        <p:spPr>
+          <a:xfrm>
+            <a:off x="356315" y="1336813"/>
+            <a:ext cx="3910349" cy="4703379"/>
+          </a:xfrm>
+        </p:spPr>
         <p:txBody>
           <a:bodyPr>
-            <a:normAutofit fontScale="85000" lnSpcReduction="20000"/>
+            <a:normAutofit/>
           </a:bodyPr>
           <a:lstStyle/>
           <a:p>
-            <a:r>
-              <a:rPr lang="en-US" dirty="0"/>
-              <a:t>We explored the state summary data in great detail and created several new features from the state data: ‘resorts_per_100kcapita’ and ’resorts_per_100ksq_mile’ to analyze.</a:t>
-            </a:r>
-          </a:p>
-          <a:p>
-            <a:r>
-              <a:rPr lang="en-US" dirty="0"/>
-              <a:t>We merged our state summary features into the ski resort data and added "state resort competition” features: ‘</a:t>
-            </a:r>
-            <a:r>
-              <a:rPr lang="en-US" dirty="0" err="1"/>
-              <a:t>resort_skiable_area_ac_state_ratio</a:t>
-            </a:r>
-            <a:r>
-              <a:rPr lang="en-US" dirty="0"/>
-              <a:t>’, ’</a:t>
-            </a:r>
-            <a:r>
-              <a:rPr lang="en-US" dirty="0" err="1"/>
-              <a:t>resort_days_open_state_ratio</a:t>
-            </a:r>
-            <a:r>
-              <a:rPr lang="en-US" dirty="0"/>
-              <a:t>’, ’</a:t>
-            </a:r>
-            <a:r>
-              <a:rPr lang="en-US" dirty="0" err="1"/>
-              <a:t>resort_terrain_park_state_ratio</a:t>
-            </a:r>
-            <a:r>
-              <a:rPr lang="en-US" dirty="0"/>
-              <a:t>’ and ’</a:t>
-            </a:r>
-            <a:r>
-              <a:rPr lang="en-US" dirty="0" err="1"/>
-              <a:t>resort_night_skiing_state_ratio</a:t>
-            </a:r>
-            <a:r>
-              <a:rPr lang="en-US" dirty="0"/>
-              <a:t>’.</a:t>
-            </a:r>
-          </a:p>
-          <a:p>
-            <a:r>
-              <a:rPr lang="en-US" dirty="0"/>
-              <a:t>We then attempted to gain a high level view of relationships amongst the features by creating a correlation heatmap hoping to identify patterns.</a:t>
-            </a:r>
-          </a:p>
-          <a:p>
-            <a:r>
-              <a:rPr lang="en-US" dirty="0"/>
-              <a:t>Since correlation can mask relationships between two variables, we created a series of scatterplots to really dive into how ticket price varies with other numeric features. In the scatterplots you see what some of the high correlations were clearly picking up on. There's a strong positive correlation with ’</a:t>
-            </a:r>
-            <a:r>
-              <a:rPr lang="en-US" dirty="0" err="1"/>
-              <a:t>vertical_drop</a:t>
-            </a:r>
-            <a:r>
-              <a:rPr lang="en-US" dirty="0"/>
-              <a:t>’, ’</a:t>
-            </a:r>
-            <a:r>
-              <a:rPr lang="en-US" dirty="0" err="1"/>
-              <a:t>fastQuads</a:t>
-            </a:r>
-            <a:r>
-              <a:rPr lang="en-US" dirty="0"/>
-              <a:t>’, ’Runs’, ’</a:t>
-            </a:r>
-            <a:r>
-              <a:rPr lang="en-US" dirty="0" err="1"/>
-              <a:t>total_chairs</a:t>
-            </a:r>
-            <a:r>
-              <a:rPr lang="en-US" dirty="0"/>
-              <a:t>’ and ’resorts_per_100kcapita’ appears useful.</a:t>
-            </a:r>
-          </a:p>
-          <a:p>
-            <a:endParaRPr lang="en-US" dirty="0"/>
-          </a:p>
-        </p:txBody>
-      </p:sp>
+            <a:pPr marL="0" indent="0">
+              <a:buNone/>
+            </a:pPr>
+            <a:endParaRPr lang="en-US" sz="2400" dirty="0"/>
+          </a:p>
+          <a:p>
+            <a:r>
+              <a:rPr lang="en-US" sz="2400" dirty="0"/>
+              <a:t>There were two kinds of ticket price, weekend and weekday</a:t>
+            </a:r>
+          </a:p>
+          <a:p>
+            <a:r>
+              <a:rPr lang="en-US" sz="2400" dirty="0"/>
+              <a:t>Most prices are around $25 to over $100 dollars </a:t>
+            </a:r>
+          </a:p>
+          <a:p>
+            <a:r>
+              <a:rPr lang="en-US" sz="2400" dirty="0"/>
+              <a:t>We decided to drop the ’</a:t>
+            </a:r>
+            <a:r>
+              <a:rPr lang="en-US" sz="2400" dirty="0" err="1"/>
+              <a:t>AdultWeekday</a:t>
+            </a:r>
+            <a:r>
+              <a:rPr lang="en-US" sz="2400" dirty="0"/>
+              <a:t>’ column</a:t>
+            </a:r>
+          </a:p>
+          <a:p>
+            <a:r>
+              <a:rPr lang="en-US" sz="2400" dirty="0"/>
+              <a:t>The target feature for our predictive model is the ‘</a:t>
+            </a:r>
+            <a:r>
+              <a:rPr lang="en-US" sz="2400" dirty="0" err="1"/>
+              <a:t>AdultWeekend</a:t>
+            </a:r>
+            <a:r>
+              <a:rPr lang="en-US" sz="2400" dirty="0"/>
+              <a:t>’ variable</a:t>
+            </a:r>
+          </a:p>
+          <a:p>
+            <a:endParaRPr lang="en-US" sz="2400" dirty="0"/>
+          </a:p>
+        </p:txBody>
+      </p:sp>
+      <p:pic>
+        <p:nvPicPr>
+          <p:cNvPr id="5" name="Picture 4" descr="Chart, bar chart&#10;&#10;Description automatically generated">
+            <a:extLst>
+              <a:ext uri="{FF2B5EF4-FFF2-40B4-BE49-F238E27FC236}">
+                <a16:creationId xmlns:a16="http://schemas.microsoft.com/office/drawing/2014/main" id="{C5088C5F-AB80-9C44-86B0-9D202F52495A}"/>
+              </a:ext>
+            </a:extLst>
+          </p:cNvPr>
+          <p:cNvPicPr>
+            <a:picLocks noChangeAspect="1"/>
+          </p:cNvPicPr>
+          <p:nvPr/>
+        </p:nvPicPr>
+        <p:blipFill rotWithShape="1">
+          <a:blip r:embed="rId2"/>
+          <a:srcRect t="4039" r="2" b="2"/>
+          <a:stretch/>
+        </p:blipFill>
+        <p:spPr>
+          <a:xfrm>
+            <a:off x="4266664" y="1513029"/>
+            <a:ext cx="7723567" cy="5168757"/>
+          </a:xfrm>
+          <a:prstGeom prst="rect">
+            <a:avLst/>
+          </a:prstGeom>
+        </p:spPr>
+      </p:pic>
     </p:spTree>
     <p:extLst>
       <p:ext uri="{BB962C8B-B14F-4D97-AF65-F5344CB8AC3E}">
-        <p14:creationId xmlns:p14="http://schemas.microsoft.com/office/powerpoint/2010/main" val="787167011"/>
+        <p14:creationId xmlns:p14="http://schemas.microsoft.com/office/powerpoint/2010/main" val="2041394780"/>
       </p:ext>
     </p:extLst>
   </p:cSld>
@@ -3855,7 +4063,7 @@
           <p:cNvPr id="2" name="Title 1">
             <a:extLst>
               <a:ext uri="{FF2B5EF4-FFF2-40B4-BE49-F238E27FC236}">
-                <a16:creationId xmlns:a16="http://schemas.microsoft.com/office/drawing/2014/main" id="{685E4B3F-8F3F-A544-B555-BF41FF16531F}"/>
+                <a16:creationId xmlns:a16="http://schemas.microsoft.com/office/drawing/2014/main" id="{31A45E89-2A2F-D445-AC09-F95CDF0B4AA6}"/>
               </a:ext>
             </a:extLst>
           </p:cNvPr>
@@ -3864,107 +4072,93 @@
           </p:cNvSpPr>
           <p:nvPr>
             <p:ph type="title"/>
+          </p:nvPr>
+        </p:nvSpPr>
+        <p:spPr/>
+        <p:txBody>
+          <a:bodyPr/>
+          <a:lstStyle/>
+          <a:p>
+            <a:pPr algn="ctr"/>
+            <a:r>
+              <a:rPr lang="en-US" b="1"/>
+              <a:t>Exploratory Data Analysis</a:t>
+            </a:r>
+            <a:endParaRPr lang="en-US" dirty="0"/>
+          </a:p>
+        </p:txBody>
+      </p:sp>
+      <p:sp>
+        <p:nvSpPr>
+          <p:cNvPr id="3" name="Content Placeholder 2">
+            <a:extLst>
+              <a:ext uri="{FF2B5EF4-FFF2-40B4-BE49-F238E27FC236}">
+                <a16:creationId xmlns:a16="http://schemas.microsoft.com/office/drawing/2014/main" id="{E8CE0F86-871F-E74D-9065-7B587768170A}"/>
+              </a:ext>
+            </a:extLst>
+          </p:cNvPr>
+          <p:cNvSpPr>
+            <a:spLocks noGrp="1"/>
+          </p:cNvSpPr>
+          <p:nvPr>
+            <p:ph idx="1"/>
           </p:nvPr>
         </p:nvSpPr>
         <p:spPr>
           <a:xfrm>
-            <a:off x="838200" y="365125"/>
-            <a:ext cx="10515600" cy="1158875"/>
+            <a:off x="676836" y="1690688"/>
+            <a:ext cx="10515600" cy="4486275"/>
           </a:xfrm>
         </p:spPr>
         <p:txBody>
-          <a:bodyPr>
-            <a:normAutofit/>
-          </a:bodyPr>
-          <a:lstStyle/>
-          <a:p>
-            <a:pPr algn="ctr"/>
-            <a:r>
-              <a:rPr lang="en-US" b="1" dirty="0">
-                <a:effectLst/>
-              </a:rPr>
-              <a:t>Pre-Processing and Training Data</a:t>
-            </a:r>
-            <a:endParaRPr lang="en-US" dirty="0"/>
-          </a:p>
-        </p:txBody>
-      </p:sp>
-      <p:sp>
-        <p:nvSpPr>
-          <p:cNvPr id="3" name="Content Placeholder 2">
-            <a:extLst>
-              <a:ext uri="{FF2B5EF4-FFF2-40B4-BE49-F238E27FC236}">
-                <a16:creationId xmlns:a16="http://schemas.microsoft.com/office/drawing/2014/main" id="{E1D41298-8A1C-124B-8EDC-46E8DC70AA24}"/>
-              </a:ext>
-            </a:extLst>
-          </p:cNvPr>
-          <p:cNvSpPr>
-            <a:spLocks noGrp="1"/>
-          </p:cNvSpPr>
-          <p:nvPr>
-            <p:ph idx="1"/>
-          </p:nvPr>
-        </p:nvSpPr>
-        <p:spPr/>
-        <p:txBody>
-          <a:bodyPr>
-            <a:normAutofit fontScale="85000" lnSpcReduction="20000"/>
-          </a:bodyPr>
+          <a:bodyPr/>
           <a:lstStyle/>
           <a:p>
             <a:r>
               <a:rPr lang="en-US" dirty="0"/>
-              <a:t>We checked to see how good the mean is as a predictor and as expected, using the average value as our prediction gives us and R2 of zero on our training set.</a:t>
-            </a:r>
-          </a:p>
-          <a:p>
-            <a:r>
-              <a:rPr lang="en-US" dirty="0"/>
-              <a:t>We created a Linear Regression model to make predictions on both the train and test splits. The linear regression model explains over 80% of the variance on the train set and over 70% on the test set. Cross-validation was used for estimating model performance and the results highlight that assessing model performance in inherently open to variability.</a:t>
-            </a:r>
-          </a:p>
-          <a:p>
-            <a:r>
-              <a:rPr lang="en-US" dirty="0"/>
-              <a:t>We then applied the Random Forest method and we marginally improved upon the default CV results. Both the linear model and the random forest agree that the dominant top four features are: ’</a:t>
-            </a:r>
-            <a:r>
-              <a:rPr lang="en-US" dirty="0" err="1"/>
-              <a:t>fastQuads</a:t>
-            </a:r>
-            <a:r>
-              <a:rPr lang="en-US" dirty="0"/>
-              <a:t>’, ’Runs’, ’Snow </a:t>
-            </a:r>
-            <a:r>
-              <a:rPr lang="en-US" dirty="0" err="1"/>
-              <a:t>Making_ac</a:t>
-            </a:r>
-            <a:r>
-              <a:rPr lang="en-US" dirty="0"/>
-              <a:t>’ and ’</a:t>
-            </a:r>
-            <a:r>
-              <a:rPr lang="en-US" dirty="0" err="1"/>
-              <a:t>vertical_drop</a:t>
-            </a:r>
-            <a:r>
-              <a:rPr lang="en-US" dirty="0"/>
-              <a:t>’.</a:t>
-            </a:r>
-          </a:p>
-          <a:p>
-            <a:r>
-              <a:rPr lang="en-US" dirty="0"/>
-              <a:t>When comparing the linear regression model performance with the random forest regression model performance, The random forest model has a lower cross-validation mean absolute error by almost $1, it the model to use going forward.</a:t>
-            </a:r>
-          </a:p>
-        </p:txBody>
-      </p:sp>
+              <a:t>The Average Adult Weekend ticket prices for resorts in each state.</a:t>
+            </a:r>
+          </a:p>
+        </p:txBody>
+      </p:sp>
+      <p:pic>
+        <p:nvPicPr>
+          <p:cNvPr id="4" name="Picture 3" descr="Chart, histogram&#10;&#10;Description automatically generated">
+            <a:extLst>
+              <a:ext uri="{FF2B5EF4-FFF2-40B4-BE49-F238E27FC236}">
+                <a16:creationId xmlns:a16="http://schemas.microsoft.com/office/drawing/2014/main" id="{57731DCD-549A-104E-A017-5D1B2280479D}"/>
+              </a:ext>
+            </a:extLst>
+          </p:cNvPr>
+          <p:cNvPicPr/>
+          <p:nvPr/>
+        </p:nvPicPr>
+        <p:blipFill>
+          <a:blip r:embed="rId2">
+            <a:extLst>
+              <a:ext uri="{28A0092B-C50C-407E-A947-70E740481C1C}">
+                <a14:useLocalDpi xmlns:a14="http://schemas.microsoft.com/office/drawing/2010/main" val="0"/>
+              </a:ext>
+            </a:extLst>
+          </a:blip>
+          <a:stretch>
+            <a:fillRect/>
+          </a:stretch>
+        </p:blipFill>
+        <p:spPr>
+          <a:xfrm>
+            <a:off x="2366683" y="2215167"/>
+            <a:ext cx="7135906" cy="4642834"/>
+          </a:xfrm>
+          <a:prstGeom prst="rect">
+            <a:avLst/>
+          </a:prstGeom>
+        </p:spPr>
+      </p:pic>
     </p:spTree>
     <p:extLst>
       <p:ext uri="{BB962C8B-B14F-4D97-AF65-F5344CB8AC3E}">
-        <p14:creationId xmlns:p14="http://schemas.microsoft.com/office/powerpoint/2010/main" val="3105843050"/>
+        <p14:creationId xmlns:p14="http://schemas.microsoft.com/office/powerpoint/2010/main" val="468706721"/>
       </p:ext>
     </p:extLst>
   </p:cSld>
@@ -3996,7 +4190,7 @@
           <p:cNvPr id="2" name="Title 1">
             <a:extLst>
               <a:ext uri="{FF2B5EF4-FFF2-40B4-BE49-F238E27FC236}">
-                <a16:creationId xmlns:a16="http://schemas.microsoft.com/office/drawing/2014/main" id="{8B160D72-286F-6146-A76A-9E46512C4A4D}"/>
+                <a16:creationId xmlns:a16="http://schemas.microsoft.com/office/drawing/2014/main" id="{2DA82B00-DCE9-E04D-A152-9B404B31CE02}"/>
               </a:ext>
             </a:extLst>
           </p:cNvPr>
@@ -4009,21 +4203,19 @@
         </p:nvSpPr>
         <p:spPr/>
         <p:txBody>
-          <a:bodyPr/>
+          <a:bodyPr>
+            <a:normAutofit/>
+          </a:bodyPr>
           <a:lstStyle/>
           <a:p>
             <a:pPr algn="ctr"/>
-            <a:r>
-              <a:rPr lang="en-US" b="1" dirty="0"/>
-              <a:t>Modeling</a:t>
-            </a:r>
             <a:r>
               <a:rPr lang="en-US" b="1" dirty="0">
                 <a:effectLst/>
               </a:rPr>
-              <a:t> results and analysis:</a:t>
-            </a:r>
-            <a:endParaRPr lang="en-US" b="1" dirty="0"/>
+              <a:t>Exploratory Data Analysis</a:t>
+            </a:r>
+            <a:endParaRPr lang="en-US" dirty="0"/>
           </a:p>
         </p:txBody>
       </p:sp>
@@ -4032,7 +4224,7 @@
           <p:cNvPr id="3" name="Content Placeholder 2">
             <a:extLst>
               <a:ext uri="{FF2B5EF4-FFF2-40B4-BE49-F238E27FC236}">
-                <a16:creationId xmlns:a16="http://schemas.microsoft.com/office/drawing/2014/main" id="{4EA4D934-F151-1C42-AD34-D67A924AE9A9}"/>
+                <a16:creationId xmlns:a16="http://schemas.microsoft.com/office/drawing/2014/main" id="{40C92DD6-FE23-8B48-83DC-67388DEF728A}"/>
               </a:ext>
             </a:extLst>
           </p:cNvPr>
@@ -4043,75 +4235,69 @@
             <p:ph idx="1"/>
           </p:nvPr>
         </p:nvSpPr>
-        <p:spPr>
-          <a:xfrm>
-            <a:off x="838200" y="1590261"/>
-            <a:ext cx="10515600" cy="4902614"/>
-          </a:xfrm>
-        </p:spPr>
+        <p:spPr/>
         <p:txBody>
           <a:bodyPr>
-            <a:normAutofit fontScale="85000" lnSpcReduction="10000"/>
+            <a:normAutofit/>
           </a:bodyPr>
           <a:lstStyle/>
           <a:p>
             <a:r>
               <a:rPr lang="en-US" dirty="0"/>
-              <a:t>Big Mountain currently charges $81.00 for the Adult Weekend ticket price, but the Resort's modelled price is $94.22, which is higher than the actual price.</a:t>
+              <a:t>We explored the state summary data and created several new features from the state data.</a:t>
             </a:r>
           </a:p>
           <a:p>
             <a:r>
               <a:rPr lang="en-US" dirty="0"/>
-              <a:t>We took our model for ski resort ticket price to gain insight into what Big Mountain's ideal ticket price could/should be, and how that might change under various scenarios, for either cutting costs or increasing revenue (from ticket prices). The business has shortlisted some options:</a:t>
-            </a:r>
-          </a:p>
-          <a:p>
-            <a:pPr marL="514350" indent="-514350">
-              <a:buFont typeface="+mj-lt"/>
-              <a:buAutoNum type="arabicPeriod"/>
-            </a:pPr>
+              <a:t>We merged our state summary features into the ski resort data and added "state resort competition” features.</a:t>
+            </a:r>
+          </a:p>
+          <a:p>
             <a:r>
               <a:rPr lang="en-US" dirty="0"/>
-              <a:t>Permanently closing up to 10 of the least used runs. This doesn't impact any other resort statistics.</a:t>
-            </a:r>
-          </a:p>
-          <a:p>
-            <a:pPr marL="514350" indent="-514350">
-              <a:buFont typeface="+mj-lt"/>
-              <a:buAutoNum type="arabicPeriod"/>
-            </a:pPr>
+              <a:t>We created a correlation heatmap hoping to identify patterns amongst the features.</a:t>
+            </a:r>
+          </a:p>
+          <a:p>
             <a:r>
               <a:rPr lang="en-US" dirty="0"/>
-              <a:t>Increase the vertical drop by adding a run to a point 150 feet lower down but requiring the installation of an additional chair lift to bring skiers back up, without additional snow making coverage</a:t>
-            </a:r>
-          </a:p>
-          <a:p>
-            <a:pPr marL="514350" indent="-514350">
-              <a:buFont typeface="+mj-lt"/>
-              <a:buAutoNum type="arabicPeriod"/>
-            </a:pPr>
+              <a:t>Scatterplots revealed a strong positive correlation with: ’</a:t>
+            </a:r>
+            <a:r>
+              <a:rPr lang="en-US" dirty="0" err="1"/>
+              <a:t>vertical_drop</a:t>
+            </a:r>
             <a:r>
               <a:rPr lang="en-US" dirty="0"/>
-              <a:t>Same as number 2, but adding 2 acres of snow making cover</a:t>
-            </a:r>
-          </a:p>
-          <a:p>
-            <a:pPr marL="514350" indent="-514350">
-              <a:buFont typeface="+mj-lt"/>
-              <a:buAutoNum type="arabicPeriod"/>
-            </a:pPr>
+              <a:t>’, ’</a:t>
+            </a:r>
+            <a:r>
+              <a:rPr lang="en-US" dirty="0" err="1"/>
+              <a:t>fastQuads</a:t>
+            </a:r>
             <a:r>
               <a:rPr lang="en-US" dirty="0"/>
-              <a:t>Increase the longest run by 0.2 mile to boast 3.5 miles length, requiring an additional snow making coverage of 4 acres</a:t>
-            </a:r>
+              <a:t>’, ’Runs’, ’</a:t>
+            </a:r>
+            <a:r>
+              <a:rPr lang="en-US" dirty="0" err="1"/>
+              <a:t>total_chairs</a:t>
+            </a:r>
+            <a:r>
+              <a:rPr lang="en-US" dirty="0"/>
+              <a:t>’ and ’resorts_per_100kcapita’.</a:t>
+            </a:r>
+          </a:p>
+          <a:p>
+            <a:endParaRPr lang="en-US" dirty="0"/>
           </a:p>
         </p:txBody>
       </p:sp>
     </p:spTree>
     <p:extLst>
       <p:ext uri="{BB962C8B-B14F-4D97-AF65-F5344CB8AC3E}">
-        <p14:creationId xmlns:p14="http://schemas.microsoft.com/office/powerpoint/2010/main" val="3644502707"/>
+        <p14:creationId xmlns:p14="http://schemas.microsoft.com/office/powerpoint/2010/main" val="787167011"/>
       </p:ext>
     </p:extLst>
   </p:cSld>
@@ -4143,7 +4329,7 @@
           <p:cNvPr id="2" name="Title 1">
             <a:extLst>
               <a:ext uri="{FF2B5EF4-FFF2-40B4-BE49-F238E27FC236}">
-                <a16:creationId xmlns:a16="http://schemas.microsoft.com/office/drawing/2014/main" id="{D7D79DDE-7A02-D149-855C-2563DB669491}"/>
+                <a16:creationId xmlns:a16="http://schemas.microsoft.com/office/drawing/2014/main" id="{4EAF780B-FFFC-A64B-BC17-9D1FFFA280BE}"/>
               </a:ext>
             </a:extLst>
           </p:cNvPr>
@@ -4162,7 +4348,7 @@
             <a:pPr algn="ctr"/>
             <a:r>
               <a:rPr lang="en-US" b="1" dirty="0"/>
-              <a:t>Summary and conclusion</a:t>
+              <a:t>Exploratory Data Analysis</a:t>
             </a:r>
             <a:endParaRPr lang="en-US" dirty="0"/>
           </a:p>
@@ -4173,7 +4359,7 @@
           <p:cNvPr id="3" name="Content Placeholder 2">
             <a:extLst>
               <a:ext uri="{FF2B5EF4-FFF2-40B4-BE49-F238E27FC236}">
-                <a16:creationId xmlns:a16="http://schemas.microsoft.com/office/drawing/2014/main" id="{E446EC71-B591-A842-8CBD-8C05D77D55A2}"/>
+                <a16:creationId xmlns:a16="http://schemas.microsoft.com/office/drawing/2014/main" id="{ADA594CD-D0A8-B346-B935-7816E6E85702}"/>
               </a:ext>
             </a:extLst>
           </p:cNvPr>
@@ -4186,45 +4372,456 @@
         </p:nvSpPr>
         <p:spPr>
           <a:xfrm>
-            <a:off x="838200" y="1417983"/>
-            <a:ext cx="10515600" cy="5074892"/>
+            <a:off x="838200" y="1429555"/>
+            <a:ext cx="10515600" cy="5063320"/>
           </a:xfrm>
         </p:spPr>
         <p:txBody>
-          <a:bodyPr>
-            <a:normAutofit lnSpcReduction="10000"/>
-          </a:bodyPr>
+          <a:bodyPr/>
           <a:lstStyle/>
           <a:p>
             <a:r>
               <a:rPr lang="en-US" dirty="0"/>
-              <a:t>Big Mountain might be undercharging, so I suggest you increase the ticket price which is supported in the marketplace. You should also review potential scenarios for either cutting costs or increasing revenue (from ticket prices).</a:t>
-            </a:r>
-          </a:p>
-          <a:p>
-            <a:r>
-              <a:rPr lang="en-US" dirty="0"/>
-              <a:t>In addition to the ticket prices and additional operating cost of the new chair lift, maintenance costs might be a useful parameter to investigate.</a:t>
-            </a:r>
-          </a:p>
-          <a:p>
-            <a:r>
-              <a:rPr lang="en-US" dirty="0"/>
-              <a:t>Our model could be lacking some key data, which could attest the higher modeled price or Big Mountain could just be mispricing.</a:t>
-            </a:r>
-          </a:p>
-          <a:p>
-            <a:r>
-              <a:rPr lang="en-US" dirty="0"/>
-              <a:t>If you find the model useful, you could implement it to see if the market really demands the higher price. The business leaders could then task their business analysts to explore and test new combinations of parameters, if the need arises.</a:t>
-            </a:r>
-          </a:p>
-        </p:txBody>
-      </p:sp>
+              <a:t>Below are further features that may be useful in that they relate to how easily a resort can transport people around.</a:t>
+            </a:r>
+          </a:p>
+        </p:txBody>
+      </p:sp>
+      <p:pic>
+        <p:nvPicPr>
+          <p:cNvPr id="4" name="Picture 3" descr="Chart, scatter chart&#10;&#10;Description automatically generated">
+            <a:extLst>
+              <a:ext uri="{FF2B5EF4-FFF2-40B4-BE49-F238E27FC236}">
+                <a16:creationId xmlns:a16="http://schemas.microsoft.com/office/drawing/2014/main" id="{66F67626-DC84-4A4A-9E30-74BE67B874DA}"/>
+              </a:ext>
+            </a:extLst>
+          </p:cNvPr>
+          <p:cNvPicPr/>
+          <p:nvPr/>
+        </p:nvPicPr>
+        <p:blipFill>
+          <a:blip r:embed="rId2">
+            <a:extLst>
+              <a:ext uri="{28A0092B-C50C-407E-A947-70E740481C1C}">
+                <a14:useLocalDpi xmlns:a14="http://schemas.microsoft.com/office/drawing/2010/main" val="0"/>
+              </a:ext>
+            </a:extLst>
+          </a:blip>
+          <a:stretch>
+            <a:fillRect/>
+          </a:stretch>
+        </p:blipFill>
+        <p:spPr>
+          <a:xfrm>
+            <a:off x="1648496" y="2305318"/>
+            <a:ext cx="8860665" cy="4406498"/>
+          </a:xfrm>
+          <a:prstGeom prst="rect">
+            <a:avLst/>
+          </a:prstGeom>
+        </p:spPr>
+      </p:pic>
     </p:spTree>
     <p:extLst>
       <p:ext uri="{BB962C8B-B14F-4D97-AF65-F5344CB8AC3E}">
-        <p14:creationId xmlns:p14="http://schemas.microsoft.com/office/powerpoint/2010/main" val="228566428"/>
+        <p14:creationId xmlns:p14="http://schemas.microsoft.com/office/powerpoint/2010/main" val="1963993228"/>
+      </p:ext>
+    </p:extLst>
+  </p:cSld>
+  <p:clrMapOvr>
+    <a:masterClrMapping/>
+  </p:clrMapOvr>
+</p:sld>
+</file>
+
+<file path=ppt/slides/slide8.xml><?xml version="1.0" encoding="utf-8"?>
+<p:sld xmlns:a="http://schemas.openxmlformats.org/drawingml/2006/main" xmlns:r="http://schemas.openxmlformats.org/officeDocument/2006/relationships" xmlns:p="http://schemas.openxmlformats.org/presentationml/2006/main">
+  <p:cSld>
+    <p:spTree>
+      <p:nvGrpSpPr>
+        <p:cNvPr id="1" name=""/>
+        <p:cNvGrpSpPr/>
+        <p:nvPr/>
+      </p:nvGrpSpPr>
+      <p:grpSpPr>
+        <a:xfrm>
+          <a:off x="0" y="0"/>
+          <a:ext cx="0" cy="0"/>
+          <a:chOff x="0" y="0"/>
+          <a:chExt cx="0" cy="0"/>
+        </a:xfrm>
+      </p:grpSpPr>
+      <p:sp>
+        <p:nvSpPr>
+          <p:cNvPr id="2" name="Title 1">
+            <a:extLst>
+              <a:ext uri="{FF2B5EF4-FFF2-40B4-BE49-F238E27FC236}">
+                <a16:creationId xmlns:a16="http://schemas.microsoft.com/office/drawing/2014/main" id="{685E4B3F-8F3F-A544-B555-BF41FF16531F}"/>
+              </a:ext>
+            </a:extLst>
+          </p:cNvPr>
+          <p:cNvSpPr>
+            <a:spLocks noGrp="1"/>
+          </p:cNvSpPr>
+          <p:nvPr>
+            <p:ph type="title"/>
+          </p:nvPr>
+        </p:nvSpPr>
+        <p:spPr>
+          <a:xfrm>
+            <a:off x="838200" y="365125"/>
+            <a:ext cx="10515600" cy="1158875"/>
+          </a:xfrm>
+        </p:spPr>
+        <p:txBody>
+          <a:bodyPr>
+            <a:normAutofit/>
+          </a:bodyPr>
+          <a:lstStyle/>
+          <a:p>
+            <a:pPr algn="ctr"/>
+            <a:r>
+              <a:rPr lang="en-US" b="1" dirty="0">
+                <a:effectLst/>
+              </a:rPr>
+              <a:t>Pre-Processing and Training Data</a:t>
+            </a:r>
+            <a:endParaRPr lang="en-US" dirty="0"/>
+          </a:p>
+        </p:txBody>
+      </p:sp>
+      <p:sp>
+        <p:nvSpPr>
+          <p:cNvPr id="3" name="Content Placeholder 2">
+            <a:extLst>
+              <a:ext uri="{FF2B5EF4-FFF2-40B4-BE49-F238E27FC236}">
+                <a16:creationId xmlns:a16="http://schemas.microsoft.com/office/drawing/2014/main" id="{E1D41298-8A1C-124B-8EDC-46E8DC70AA24}"/>
+              </a:ext>
+            </a:extLst>
+          </p:cNvPr>
+          <p:cNvSpPr>
+            <a:spLocks noGrp="1"/>
+          </p:cNvSpPr>
+          <p:nvPr>
+            <p:ph idx="1"/>
+          </p:nvPr>
+        </p:nvSpPr>
+        <p:spPr/>
+        <p:txBody>
+          <a:bodyPr>
+            <a:normAutofit/>
+          </a:bodyPr>
+          <a:lstStyle/>
+          <a:p>
+            <a:r>
+              <a:rPr lang="en-US" dirty="0"/>
+              <a:t>We checked to see how good the mean is as a predictor and as expected, using the average value as our prediction gives us and R2 of zero on our training set.</a:t>
+            </a:r>
+          </a:p>
+          <a:p>
+            <a:r>
+              <a:rPr lang="en-US" dirty="0"/>
+              <a:t>The linear regression model explains over 80% of the variance on the train set and over 70% on the test set.</a:t>
+            </a:r>
+          </a:p>
+          <a:p>
+            <a:r>
+              <a:rPr lang="en-US" dirty="0"/>
+              <a:t>The dominant top four features for the linear and the random forest models are: ’</a:t>
+            </a:r>
+            <a:r>
+              <a:rPr lang="en-US" dirty="0" err="1"/>
+              <a:t>fastQuads</a:t>
+            </a:r>
+            <a:r>
+              <a:rPr lang="en-US" dirty="0"/>
+              <a:t>’, ’Runs’, ’Snow </a:t>
+            </a:r>
+            <a:r>
+              <a:rPr lang="en-US" dirty="0" err="1"/>
+              <a:t>Making_ac</a:t>
+            </a:r>
+            <a:r>
+              <a:rPr lang="en-US" dirty="0"/>
+              <a:t>’ and ’</a:t>
+            </a:r>
+            <a:r>
+              <a:rPr lang="en-US" dirty="0" err="1"/>
+              <a:t>vertical_drop</a:t>
+            </a:r>
+            <a:r>
+              <a:rPr lang="en-US" dirty="0"/>
+              <a:t>’.</a:t>
+            </a:r>
+          </a:p>
+          <a:p>
+            <a:r>
+              <a:rPr lang="en-US" dirty="0"/>
+              <a:t>The random forest model has a lower cross-validation mean absolute error by almost $1, it the model to use going forward.</a:t>
+            </a:r>
+          </a:p>
+        </p:txBody>
+      </p:sp>
+    </p:spTree>
+    <p:extLst>
+      <p:ext uri="{BB962C8B-B14F-4D97-AF65-F5344CB8AC3E}">
+        <p14:creationId xmlns:p14="http://schemas.microsoft.com/office/powerpoint/2010/main" val="3105843050"/>
+      </p:ext>
+    </p:extLst>
+  </p:cSld>
+  <p:clrMapOvr>
+    <a:masterClrMapping/>
+  </p:clrMapOvr>
+</p:sld>
+</file>
+
+<file path=ppt/slides/slide9.xml><?xml version="1.0" encoding="utf-8"?>
+<p:sld xmlns:a="http://schemas.openxmlformats.org/drawingml/2006/main" xmlns:r="http://schemas.openxmlformats.org/officeDocument/2006/relationships" xmlns:p="http://schemas.openxmlformats.org/presentationml/2006/main">
+  <p:cSld>
+    <p:bg>
+      <p:bgPr>
+        <a:solidFill>
+          <a:schemeClr val="bg1"/>
+        </a:solidFill>
+        <a:effectLst/>
+      </p:bgPr>
+    </p:bg>
+    <p:spTree>
+      <p:nvGrpSpPr>
+        <p:cNvPr id="1" name=""/>
+        <p:cNvGrpSpPr/>
+        <p:nvPr/>
+      </p:nvGrpSpPr>
+      <p:grpSpPr>
+        <a:xfrm>
+          <a:off x="0" y="0"/>
+          <a:ext cx="0" cy="0"/>
+          <a:chOff x="0" y="0"/>
+          <a:chExt cx="0" cy="0"/>
+        </a:xfrm>
+      </p:grpSpPr>
+      <p:sp useBgFill="1">
+        <p:nvSpPr>
+          <p:cNvPr id="11" name="Rectangle 8">
+            <a:extLst>
+              <a:ext uri="{FF2B5EF4-FFF2-40B4-BE49-F238E27FC236}">
+                <a16:creationId xmlns:a16="http://schemas.microsoft.com/office/drawing/2014/main" id="{DC6BEC6B-5C77-412D-B45A-5B0F46FEDAC7}"/>
+              </a:ext>
+              <a:ext uri="{C183D7F6-B498-43B3-948B-1728B52AA6E4}">
+                <adec:decorative xmlns:adec="http://schemas.microsoft.com/office/drawing/2017/decorative" val="1"/>
+              </a:ext>
+            </a:extLst>
+          </p:cNvPr>
+          <p:cNvSpPr>
+            <a:spLocks noGrp="1" noRot="1" noChangeAspect="1" noMove="1" noResize="1" noEditPoints="1" noAdjustHandles="1" noChangeArrowheads="1" noChangeShapeType="1" noTextEdit="1"/>
+          </p:cNvSpPr>
+          <p:nvPr>
+            <p:extLst>
+              <p:ext uri="{386F3935-93C4-4BCD-93E2-E3B085C9AB24}">
+                <p16:designElem xmlns:p16="http://schemas.microsoft.com/office/powerpoint/2015/main" val="1"/>
+              </p:ext>
+            </p:extLst>
+          </p:nvPr>
+        </p:nvSpPr>
+        <p:spPr>
+          <a:xfrm>
+            <a:off x="-1" y="0"/>
+            <a:ext cx="12188952" cy="6858000"/>
+          </a:xfrm>
+          <a:prstGeom prst="rect">
+            <a:avLst/>
+          </a:prstGeom>
+          <a:ln>
+            <a:noFill/>
+          </a:ln>
+        </p:spPr>
+        <p:style>
+          <a:lnRef idx="2">
+            <a:schemeClr val="accent1">
+              <a:shade val="50000"/>
+            </a:schemeClr>
+          </a:lnRef>
+          <a:fillRef idx="1">
+            <a:schemeClr val="accent1"/>
+          </a:fillRef>
+          <a:effectRef idx="0">
+            <a:schemeClr val="accent1"/>
+          </a:effectRef>
+          <a:fontRef idx="minor">
+            <a:schemeClr val="lt1"/>
+          </a:fontRef>
+        </p:style>
+        <p:txBody>
+          <a:bodyPr rtlCol="0" anchor="ctr"/>
+          <a:lstStyle/>
+          <a:p>
+            <a:pPr algn="ctr"/>
+            <a:endParaRPr lang="en-US"/>
+          </a:p>
+        </p:txBody>
+      </p:sp>
+      <p:sp>
+        <p:nvSpPr>
+          <p:cNvPr id="2" name="Title 1">
+            <a:extLst>
+              <a:ext uri="{FF2B5EF4-FFF2-40B4-BE49-F238E27FC236}">
+                <a16:creationId xmlns:a16="http://schemas.microsoft.com/office/drawing/2014/main" id="{8B160D72-286F-6146-A76A-9E46512C4A4D}"/>
+              </a:ext>
+            </a:extLst>
+          </p:cNvPr>
+          <p:cNvSpPr>
+            <a:spLocks noGrp="1"/>
+          </p:cNvSpPr>
+          <p:nvPr>
+            <p:ph type="title"/>
+          </p:nvPr>
+        </p:nvSpPr>
+        <p:spPr>
+          <a:xfrm>
+            <a:off x="838200" y="176214"/>
+            <a:ext cx="10515600" cy="1481188"/>
+          </a:xfrm>
+        </p:spPr>
+        <p:txBody>
+          <a:bodyPr>
+            <a:normAutofit/>
+          </a:bodyPr>
+          <a:lstStyle/>
+          <a:p>
+            <a:pPr algn="ctr"/>
+            <a:r>
+              <a:rPr lang="en-US" sz="4000" b="1"/>
+              <a:t>Modeling</a:t>
+            </a:r>
+            <a:r>
+              <a:rPr lang="en-US" sz="4000" b="1">
+                <a:effectLst/>
+              </a:rPr>
+              <a:t> results and analysis:</a:t>
+            </a:r>
+            <a:endParaRPr lang="en-US" sz="4000" b="1"/>
+          </a:p>
+        </p:txBody>
+      </p:sp>
+      <p:sp>
+        <p:nvSpPr>
+          <p:cNvPr id="3" name="Content Placeholder 2">
+            <a:extLst>
+              <a:ext uri="{FF2B5EF4-FFF2-40B4-BE49-F238E27FC236}">
+                <a16:creationId xmlns:a16="http://schemas.microsoft.com/office/drawing/2014/main" id="{4EA4D934-F151-1C42-AD34-D67A924AE9A9}"/>
+              </a:ext>
+            </a:extLst>
+          </p:cNvPr>
+          <p:cNvSpPr>
+            <a:spLocks noGrp="1"/>
+          </p:cNvSpPr>
+          <p:nvPr>
+            <p:ph idx="1"/>
+          </p:nvPr>
+        </p:nvSpPr>
+        <p:spPr>
+          <a:xfrm>
+            <a:off x="214648" y="1300766"/>
+            <a:ext cx="4021175" cy="5241702"/>
+          </a:xfrm>
+        </p:spPr>
+        <p:txBody>
+          <a:bodyPr>
+            <a:noAutofit/>
+          </a:bodyPr>
+          <a:lstStyle/>
+          <a:p>
+            <a:r>
+              <a:rPr lang="en-US" sz="1800" dirty="0"/>
+              <a:t>Big Mountain currently charges $81.00 for the Adult Weekend ticket price, but the Resort's modelled price is $94.22, which is higher than the actual price.</a:t>
+            </a:r>
+          </a:p>
+          <a:p>
+            <a:r>
+              <a:rPr lang="en-US" sz="1800" dirty="0"/>
+              <a:t>We reviewed several potential scenarios for either cutting costs or increasing revenue (from ticket prices):</a:t>
+            </a:r>
+          </a:p>
+          <a:p>
+            <a:pPr marL="514350" indent="-514350">
+              <a:buFont typeface="+mj-lt"/>
+              <a:buAutoNum type="arabicPeriod"/>
+            </a:pPr>
+            <a:r>
+              <a:rPr lang="en-US" sz="1800" dirty="0"/>
+              <a:t>Permanently closing up to 10 of the least used runs.</a:t>
+            </a:r>
+          </a:p>
+          <a:p>
+            <a:pPr marL="514350" indent="-514350">
+              <a:buFont typeface="+mj-lt"/>
+              <a:buAutoNum type="arabicPeriod"/>
+            </a:pPr>
+            <a:r>
+              <a:rPr lang="en-US" sz="1800" dirty="0"/>
+              <a:t>Increase the vertical drop, which requires the installation of an additional chair lift, without additional snow making coverage.</a:t>
+            </a:r>
+          </a:p>
+          <a:p>
+            <a:pPr marL="514350" indent="-514350">
+              <a:buFont typeface="+mj-lt"/>
+              <a:buAutoNum type="arabicPeriod"/>
+            </a:pPr>
+            <a:r>
+              <a:rPr lang="en-US" sz="1800" dirty="0"/>
+              <a:t>Same as #2 but adding two acres of snow making cover.</a:t>
+            </a:r>
+          </a:p>
+          <a:p>
+            <a:pPr marL="514350" indent="-514350">
+              <a:buFont typeface="+mj-lt"/>
+              <a:buAutoNum type="arabicPeriod"/>
+            </a:pPr>
+            <a:r>
+              <a:rPr lang="en-US" sz="1800" dirty="0"/>
+              <a:t>Increase the longest run.</a:t>
+            </a:r>
+          </a:p>
+        </p:txBody>
+      </p:sp>
+      <p:pic>
+        <p:nvPicPr>
+          <p:cNvPr id="7" name="Picture 6" descr="Chart, line chart&#10;&#10;Description automatically generated">
+            <a:extLst>
+              <a:ext uri="{FF2B5EF4-FFF2-40B4-BE49-F238E27FC236}">
+                <a16:creationId xmlns:a16="http://schemas.microsoft.com/office/drawing/2014/main" id="{10C1D336-C2C1-604B-A650-EC1C83B4AFDA}"/>
+              </a:ext>
+            </a:extLst>
+          </p:cNvPr>
+          <p:cNvPicPr/>
+          <p:nvPr/>
+        </p:nvPicPr>
+        <p:blipFill>
+          <a:blip r:embed="rId2">
+            <a:extLst>
+              <a:ext uri="{28A0092B-C50C-407E-A947-70E740481C1C}">
+                <a14:useLocalDpi xmlns:a14="http://schemas.microsoft.com/office/drawing/2010/main" val="0"/>
+              </a:ext>
+            </a:extLst>
+          </a:blip>
+          <a:stretch>
+            <a:fillRect/>
+          </a:stretch>
+        </p:blipFill>
+        <p:spPr>
+          <a:xfrm>
+            <a:off x="4450472" y="1416424"/>
+            <a:ext cx="7632679" cy="4829830"/>
+          </a:xfrm>
+          <a:prstGeom prst="rect">
+            <a:avLst/>
+          </a:prstGeom>
+        </p:spPr>
+      </p:pic>
+    </p:spTree>
+    <p:extLst>
+      <p:ext uri="{BB962C8B-B14F-4D97-AF65-F5344CB8AC3E}">
+        <p14:creationId xmlns:p14="http://schemas.microsoft.com/office/powerpoint/2010/main" val="3644502707"/>
       </p:ext>
     </p:extLst>
   </p:cSld>

</xml_diff>